<commit_message>
updated graphs for paper
</commit_message>
<xml_diff>
--- a/PL_figures011221.pptx
+++ b/PL_figures011221.pptx
@@ -261,7 +261,7 @@
           <a:p>
             <a:fld id="{0390EDF6-89CC-9E4A-B12E-A3BB1C8B02AC}" type="datetimeFigureOut">
               <a:rPr lang="en-US" smtClean="0"/>
-              <a:t>1/13/22</a:t>
+              <a:t>7/7/22</a:t>
             </a:fld>
             <a:endParaRPr lang="en-US"/>
           </a:p>
@@ -459,7 +459,7 @@
           <a:p>
             <a:fld id="{0390EDF6-89CC-9E4A-B12E-A3BB1C8B02AC}" type="datetimeFigureOut">
               <a:rPr lang="en-US" smtClean="0"/>
-              <a:t>1/13/22</a:t>
+              <a:t>7/7/22</a:t>
             </a:fld>
             <a:endParaRPr lang="en-US"/>
           </a:p>
@@ -667,7 +667,7 @@
           <a:p>
             <a:fld id="{0390EDF6-89CC-9E4A-B12E-A3BB1C8B02AC}" type="datetimeFigureOut">
               <a:rPr lang="en-US" smtClean="0"/>
-              <a:t>1/13/22</a:t>
+              <a:t>7/7/22</a:t>
             </a:fld>
             <a:endParaRPr lang="en-US"/>
           </a:p>
@@ -865,7 +865,7 @@
           <a:p>
             <a:fld id="{0390EDF6-89CC-9E4A-B12E-A3BB1C8B02AC}" type="datetimeFigureOut">
               <a:rPr lang="en-US" smtClean="0"/>
-              <a:t>1/13/22</a:t>
+              <a:t>7/7/22</a:t>
             </a:fld>
             <a:endParaRPr lang="en-US"/>
           </a:p>
@@ -1140,7 +1140,7 @@
           <a:p>
             <a:fld id="{0390EDF6-89CC-9E4A-B12E-A3BB1C8B02AC}" type="datetimeFigureOut">
               <a:rPr lang="en-US" smtClean="0"/>
-              <a:t>1/13/22</a:t>
+              <a:t>7/7/22</a:t>
             </a:fld>
             <a:endParaRPr lang="en-US"/>
           </a:p>
@@ -1405,7 +1405,7 @@
           <a:p>
             <a:fld id="{0390EDF6-89CC-9E4A-B12E-A3BB1C8B02AC}" type="datetimeFigureOut">
               <a:rPr lang="en-US" smtClean="0"/>
-              <a:t>1/13/22</a:t>
+              <a:t>7/7/22</a:t>
             </a:fld>
             <a:endParaRPr lang="en-US"/>
           </a:p>
@@ -1817,7 +1817,7 @@
           <a:p>
             <a:fld id="{0390EDF6-89CC-9E4A-B12E-A3BB1C8B02AC}" type="datetimeFigureOut">
               <a:rPr lang="en-US" smtClean="0"/>
-              <a:t>1/13/22</a:t>
+              <a:t>7/7/22</a:t>
             </a:fld>
             <a:endParaRPr lang="en-US"/>
           </a:p>
@@ -1958,7 +1958,7 @@
           <a:p>
             <a:fld id="{0390EDF6-89CC-9E4A-B12E-A3BB1C8B02AC}" type="datetimeFigureOut">
               <a:rPr lang="en-US" smtClean="0"/>
-              <a:t>1/13/22</a:t>
+              <a:t>7/7/22</a:t>
             </a:fld>
             <a:endParaRPr lang="en-US"/>
           </a:p>
@@ -2071,7 +2071,7 @@
           <a:p>
             <a:fld id="{0390EDF6-89CC-9E4A-B12E-A3BB1C8B02AC}" type="datetimeFigureOut">
               <a:rPr lang="en-US" smtClean="0"/>
-              <a:t>1/13/22</a:t>
+              <a:t>7/7/22</a:t>
             </a:fld>
             <a:endParaRPr lang="en-US"/>
           </a:p>
@@ -2382,7 +2382,7 @@
           <a:p>
             <a:fld id="{0390EDF6-89CC-9E4A-B12E-A3BB1C8B02AC}" type="datetimeFigureOut">
               <a:rPr lang="en-US" smtClean="0"/>
-              <a:t>1/13/22</a:t>
+              <a:t>7/7/22</a:t>
             </a:fld>
             <a:endParaRPr lang="en-US"/>
           </a:p>
@@ -2670,7 +2670,7 @@
           <a:p>
             <a:fld id="{0390EDF6-89CC-9E4A-B12E-A3BB1C8B02AC}" type="datetimeFigureOut">
               <a:rPr lang="en-US" smtClean="0"/>
-              <a:t>1/13/22</a:t>
+              <a:t>7/7/22</a:t>
             </a:fld>
             <a:endParaRPr lang="en-US"/>
           </a:p>
@@ -2911,7 +2911,7 @@
           <a:p>
             <a:fld id="{0390EDF6-89CC-9E4A-B12E-A3BB1C8B02AC}" type="datetimeFigureOut">
               <a:rPr lang="en-US" smtClean="0"/>
-              <a:t>1/13/22</a:t>
+              <a:t>7/7/22</a:t>
             </a:fld>
             <a:endParaRPr lang="en-US"/>
           </a:p>
@@ -3328,88 +3328,12 @@
           <a:chExt cx="0" cy="0"/>
         </a:xfrm>
       </p:grpSpPr>
-      <p:sp>
-        <p:nvSpPr>
-          <p:cNvPr id="8" name="TextBox 7">
-            <a:extLst>
-              <a:ext uri="{FF2B5EF4-FFF2-40B4-BE49-F238E27FC236}">
-                <a16:creationId xmlns:a16="http://schemas.microsoft.com/office/drawing/2014/main" id="{4FC16883-B7F7-9F4F-9BDE-8546FE5BD54C}"/>
-              </a:ext>
-            </a:extLst>
-          </p:cNvPr>
-          <p:cNvSpPr txBox="1"/>
-          <p:nvPr/>
-        </p:nvSpPr>
-        <p:spPr>
-          <a:xfrm>
-            <a:off x="4345979" y="12852"/>
-            <a:ext cx="2323328" cy="338554"/>
-          </a:xfrm>
-          <a:prstGeom prst="rect">
-            <a:avLst/>
-          </a:prstGeom>
-          <a:noFill/>
-        </p:spPr>
-        <p:txBody>
-          <a:bodyPr wrap="none" rtlCol="0">
-            <a:spAutoFit/>
-          </a:bodyPr>
-          <a:lstStyle/>
-          <a:p>
-            <a:r>
-              <a:rPr lang="en-US" sz="1600" dirty="0">
-                <a:latin typeface="Times New Roman" panose="02020603050405020304" pitchFamily="18" charset="0"/>
-                <a:cs typeface="Times New Roman" panose="02020603050405020304" pitchFamily="18" charset="0"/>
-              </a:rPr>
-              <a:t>B. Mirror Tracing (errors)</a:t>
-            </a:r>
-          </a:p>
-        </p:txBody>
-      </p:sp>
-      <p:sp>
-        <p:nvSpPr>
-          <p:cNvPr id="9" name="TextBox 8">
-            <a:extLst>
-              <a:ext uri="{FF2B5EF4-FFF2-40B4-BE49-F238E27FC236}">
-                <a16:creationId xmlns:a16="http://schemas.microsoft.com/office/drawing/2014/main" id="{E01303D7-8A07-0841-90F7-EC92D251D2D6}"/>
-              </a:ext>
-            </a:extLst>
-          </p:cNvPr>
-          <p:cNvSpPr txBox="1"/>
-          <p:nvPr/>
-        </p:nvSpPr>
-        <p:spPr>
-          <a:xfrm>
-            <a:off x="682880" y="12852"/>
-            <a:ext cx="1635384" cy="338554"/>
-          </a:xfrm>
-          <a:prstGeom prst="rect">
-            <a:avLst/>
-          </a:prstGeom>
-          <a:noFill/>
-        </p:spPr>
-        <p:txBody>
-          <a:bodyPr wrap="none" rtlCol="0">
-            <a:spAutoFit/>
-          </a:bodyPr>
-          <a:lstStyle/>
-          <a:p>
-            <a:r>
-              <a:rPr lang="en-US" sz="1600" dirty="0">
-                <a:latin typeface="Times New Roman" panose="02020603050405020304" pitchFamily="18" charset="0"/>
-                <a:cs typeface="Times New Roman" panose="02020603050405020304" pitchFamily="18" charset="0"/>
-              </a:rPr>
-              <a:t>A. Rotary Pursuit</a:t>
-            </a:r>
-          </a:p>
-        </p:txBody>
-      </p:sp>
       <p:pic>
         <p:nvPicPr>
-          <p:cNvPr id="10" name="Picture 9">
-            <a:extLst>
-              <a:ext uri="{FF2B5EF4-FFF2-40B4-BE49-F238E27FC236}">
-                <a16:creationId xmlns:a16="http://schemas.microsoft.com/office/drawing/2014/main" id="{FD3ACB89-5BFD-9B4D-ADB6-5114790B8FCE}"/>
+          <p:cNvPr id="14" name="Picture 13">
+            <a:extLst>
+              <a:ext uri="{FF2B5EF4-FFF2-40B4-BE49-F238E27FC236}">
+                <a16:creationId xmlns:a16="http://schemas.microsoft.com/office/drawing/2014/main" id="{82F4A4AE-DFC4-2E42-990B-3C5287EE8617}"/>
               </a:ext>
             </a:extLst>
           </p:cNvPr>
@@ -3420,63 +3344,25 @@
         </p:nvPicPr>
         <p:blipFill rotWithShape="1">
           <a:blip r:embed="rId2"/>
-          <a:srcRect l="84336" t="35830" b="44863"/>
+          <a:srcRect r="13876"/>
           <a:stretch/>
         </p:blipFill>
         <p:spPr>
           <a:xfrm>
-            <a:off x="10950837" y="623605"/>
-            <a:ext cx="839245" cy="638448"/>
+            <a:off x="7163009" y="4078510"/>
+            <a:ext cx="3854327" cy="3222702"/>
           </a:xfrm>
           <a:prstGeom prst="rect">
             <a:avLst/>
           </a:prstGeom>
         </p:spPr>
       </p:pic>
-      <p:sp>
-        <p:nvSpPr>
-          <p:cNvPr id="13" name="TextBox 12">
-            <a:extLst>
-              <a:ext uri="{FF2B5EF4-FFF2-40B4-BE49-F238E27FC236}">
-                <a16:creationId xmlns:a16="http://schemas.microsoft.com/office/drawing/2014/main" id="{C7B6C465-7F7F-3148-8303-207800C30F39}"/>
-              </a:ext>
-            </a:extLst>
-          </p:cNvPr>
-          <p:cNvSpPr txBox="1"/>
-          <p:nvPr/>
-        </p:nvSpPr>
-        <p:spPr>
-          <a:xfrm>
-            <a:off x="8368922" y="12852"/>
-            <a:ext cx="2209516" cy="338554"/>
-          </a:xfrm>
-          <a:prstGeom prst="rect">
-            <a:avLst/>
-          </a:prstGeom>
-          <a:noFill/>
-        </p:spPr>
-        <p:txBody>
-          <a:bodyPr wrap="none" rtlCol="0">
-            <a:spAutoFit/>
-          </a:bodyPr>
-          <a:lstStyle/>
-          <a:p>
-            <a:r>
-              <a:rPr lang="en-US" sz="1600" dirty="0">
-                <a:latin typeface="Times New Roman" panose="02020603050405020304" pitchFamily="18" charset="0"/>
-                <a:cs typeface="Times New Roman" panose="02020603050405020304" pitchFamily="18" charset="0"/>
-              </a:rPr>
-              <a:t>C. Mirror Tracing (time)</a:t>
-            </a:r>
-          </a:p>
-        </p:txBody>
-      </p:sp>
       <p:pic>
         <p:nvPicPr>
-          <p:cNvPr id="14" name="Picture 13">
-            <a:extLst>
-              <a:ext uri="{FF2B5EF4-FFF2-40B4-BE49-F238E27FC236}">
-                <a16:creationId xmlns:a16="http://schemas.microsoft.com/office/drawing/2014/main" id="{82F4A4AE-DFC4-2E42-990B-3C5287EE8617}"/>
+          <p:cNvPr id="15" name="Picture 14">
+            <a:extLst>
+              <a:ext uri="{FF2B5EF4-FFF2-40B4-BE49-F238E27FC236}">
+                <a16:creationId xmlns:a16="http://schemas.microsoft.com/office/drawing/2014/main" id="{986EFA12-1CE8-E14B-AA0C-5B4C157E3119}"/>
               </a:ext>
             </a:extLst>
           </p:cNvPr>
@@ -3487,13 +3373,13 @@
         </p:nvPicPr>
         <p:blipFill rotWithShape="1">
           <a:blip r:embed="rId3"/>
-          <a:srcRect r="13876"/>
+          <a:srcRect r="8925"/>
           <a:stretch/>
         </p:blipFill>
         <p:spPr>
           <a:xfrm>
-            <a:off x="7991429" y="3690885"/>
-            <a:ext cx="3854327" cy="3222702"/>
+            <a:off x="187890" y="4048539"/>
+            <a:ext cx="6468891" cy="2871359"/>
           </a:xfrm>
           <a:prstGeom prst="rect">
             <a:avLst/>
@@ -3502,10 +3388,10 @@
       </p:pic>
       <p:pic>
         <p:nvPicPr>
-          <p:cNvPr id="15" name="Picture 14">
-            <a:extLst>
-              <a:ext uri="{FF2B5EF4-FFF2-40B4-BE49-F238E27FC236}">
-                <a16:creationId xmlns:a16="http://schemas.microsoft.com/office/drawing/2014/main" id="{986EFA12-1CE8-E14B-AA0C-5B4C157E3119}"/>
+          <p:cNvPr id="18" name="Picture 17">
+            <a:extLst>
+              <a:ext uri="{FF2B5EF4-FFF2-40B4-BE49-F238E27FC236}">
+                <a16:creationId xmlns:a16="http://schemas.microsoft.com/office/drawing/2014/main" id="{9886E1FE-1630-CC47-BECB-DA3D4D49E145}"/>
               </a:ext>
             </a:extLst>
           </p:cNvPr>
@@ -3516,101 +3402,25 @@
         </p:nvPicPr>
         <p:blipFill rotWithShape="1">
           <a:blip r:embed="rId4"/>
-          <a:srcRect r="8925"/>
+          <a:srcRect r="19031"/>
           <a:stretch/>
         </p:blipFill>
         <p:spPr>
           <a:xfrm>
-            <a:off x="200416" y="3866557"/>
-            <a:ext cx="6468891" cy="2871359"/>
+            <a:off x="18979" y="296629"/>
+            <a:ext cx="3960347" cy="3548861"/>
           </a:xfrm>
           <a:prstGeom prst="rect">
             <a:avLst/>
           </a:prstGeom>
         </p:spPr>
       </p:pic>
-      <p:sp>
-        <p:nvSpPr>
-          <p:cNvPr id="16" name="TextBox 15">
-            <a:extLst>
-              <a:ext uri="{FF2B5EF4-FFF2-40B4-BE49-F238E27FC236}">
-                <a16:creationId xmlns:a16="http://schemas.microsoft.com/office/drawing/2014/main" id="{E32102C2-A032-4A43-BA60-A2B52B24C10A}"/>
-              </a:ext>
-            </a:extLst>
-          </p:cNvPr>
-          <p:cNvSpPr txBox="1"/>
-          <p:nvPr/>
-        </p:nvSpPr>
-        <p:spPr>
-          <a:xfrm>
-            <a:off x="617923" y="3528003"/>
-            <a:ext cx="2813463" cy="338554"/>
-          </a:xfrm>
-          <a:prstGeom prst="rect">
-            <a:avLst/>
-          </a:prstGeom>
-          <a:noFill/>
-        </p:spPr>
-        <p:txBody>
-          <a:bodyPr wrap="none" rtlCol="0">
-            <a:spAutoFit/>
-          </a:bodyPr>
-          <a:lstStyle/>
-          <a:p>
-            <a:r>
-              <a:rPr lang="en-US" sz="1600" dirty="0">
-                <a:latin typeface="Times New Roman" panose="02020603050405020304" pitchFamily="18" charset="0"/>
-                <a:cs typeface="Times New Roman" panose="02020603050405020304" pitchFamily="18" charset="0"/>
-              </a:rPr>
-              <a:t>C. Auditory Statistical Learning</a:t>
-            </a:r>
-          </a:p>
-        </p:txBody>
-      </p:sp>
-      <p:sp>
-        <p:nvSpPr>
-          <p:cNvPr id="17" name="TextBox 16">
-            <a:extLst>
-              <a:ext uri="{FF2B5EF4-FFF2-40B4-BE49-F238E27FC236}">
-                <a16:creationId xmlns:a16="http://schemas.microsoft.com/office/drawing/2014/main" id="{6E7B61C2-8493-8542-9483-7DC9A3309C7D}"/>
-              </a:ext>
-            </a:extLst>
-          </p:cNvPr>
-          <p:cNvSpPr txBox="1"/>
-          <p:nvPr/>
-        </p:nvSpPr>
-        <p:spPr>
-          <a:xfrm>
-            <a:off x="8368922" y="3341061"/>
-            <a:ext cx="2614818" cy="338554"/>
-          </a:xfrm>
-          <a:prstGeom prst="rect">
-            <a:avLst/>
-          </a:prstGeom>
-          <a:noFill/>
-        </p:spPr>
-        <p:txBody>
-          <a:bodyPr wrap="none" rtlCol="0">
-            <a:spAutoFit/>
-          </a:bodyPr>
-          <a:lstStyle/>
-          <a:p>
-            <a:r>
-              <a:rPr lang="en-US" sz="1600" dirty="0">
-                <a:latin typeface="Times New Roman" panose="02020603050405020304" pitchFamily="18" charset="0"/>
-                <a:cs typeface="Times New Roman" panose="02020603050405020304" pitchFamily="18" charset="0"/>
-              </a:rPr>
-              <a:t>D. Visual Statistical Learning</a:t>
-            </a:r>
-          </a:p>
-        </p:txBody>
-      </p:sp>
       <p:pic>
         <p:nvPicPr>
-          <p:cNvPr id="18" name="Picture 17">
-            <a:extLst>
-              <a:ext uri="{FF2B5EF4-FFF2-40B4-BE49-F238E27FC236}">
-                <a16:creationId xmlns:a16="http://schemas.microsoft.com/office/drawing/2014/main" id="{9886E1FE-1630-CC47-BECB-DA3D4D49E145}"/>
+          <p:cNvPr id="19" name="Picture 18">
+            <a:extLst>
+              <a:ext uri="{FF2B5EF4-FFF2-40B4-BE49-F238E27FC236}">
+                <a16:creationId xmlns:a16="http://schemas.microsoft.com/office/drawing/2014/main" id="{E9F7120D-AC21-AF40-9582-12E720620FB8}"/>
               </a:ext>
             </a:extLst>
           </p:cNvPr>
@@ -3621,25 +3431,347 @@
         </p:nvPicPr>
         <p:blipFill rotWithShape="1">
           <a:blip r:embed="rId5"/>
-          <a:srcRect r="19031"/>
+          <a:srcRect r="20729"/>
           <a:stretch/>
         </p:blipFill>
         <p:spPr>
           <a:xfrm>
-            <a:off x="213171" y="423310"/>
-            <a:ext cx="3581781" cy="3209629"/>
+            <a:off x="3969929" y="296629"/>
+            <a:ext cx="3547161" cy="3381290"/>
           </a:xfrm>
           <a:prstGeom prst="rect">
             <a:avLst/>
           </a:prstGeom>
         </p:spPr>
       </p:pic>
+      <p:cxnSp>
+        <p:nvCxnSpPr>
+          <p:cNvPr id="3" name="Straight Connector 2">
+            <a:extLst>
+              <a:ext uri="{FF2B5EF4-FFF2-40B4-BE49-F238E27FC236}">
+                <a16:creationId xmlns:a16="http://schemas.microsoft.com/office/drawing/2014/main" id="{8969E330-E167-4A45-951A-B9E380CAC0F4}"/>
+              </a:ext>
+            </a:extLst>
+          </p:cNvPr>
+          <p:cNvCxnSpPr/>
+          <p:nvPr/>
+        </p:nvCxnSpPr>
+        <p:spPr>
+          <a:xfrm flipV="1">
+            <a:off x="1528175" y="1102289"/>
+            <a:ext cx="0" cy="2141951"/>
+          </a:xfrm>
+          <a:prstGeom prst="line">
+            <a:avLst/>
+          </a:prstGeom>
+          <a:ln w="28575">
+            <a:solidFill>
+              <a:schemeClr val="bg1">
+                <a:lumMod val="50000"/>
+              </a:schemeClr>
+            </a:solidFill>
+            <a:prstDash val="dashDot"/>
+          </a:ln>
+        </p:spPr>
+        <p:style>
+          <a:lnRef idx="1">
+            <a:schemeClr val="accent1"/>
+          </a:lnRef>
+          <a:fillRef idx="0">
+            <a:schemeClr val="accent1"/>
+          </a:fillRef>
+          <a:effectRef idx="0">
+            <a:schemeClr val="accent1"/>
+          </a:effectRef>
+          <a:fontRef idx="minor">
+            <a:schemeClr val="tx1"/>
+          </a:fontRef>
+        </p:style>
+      </p:cxnSp>
+      <p:cxnSp>
+        <p:nvCxnSpPr>
+          <p:cNvPr id="21" name="Straight Connector 20">
+            <a:extLst>
+              <a:ext uri="{FF2B5EF4-FFF2-40B4-BE49-F238E27FC236}">
+                <a16:creationId xmlns:a16="http://schemas.microsoft.com/office/drawing/2014/main" id="{AFD2CA14-1907-ED4C-9B1E-2070355F4199}"/>
+              </a:ext>
+            </a:extLst>
+          </p:cNvPr>
+          <p:cNvCxnSpPr/>
+          <p:nvPr/>
+        </p:nvCxnSpPr>
+        <p:spPr>
+          <a:xfrm flipV="1">
+            <a:off x="2269298" y="1102290"/>
+            <a:ext cx="0" cy="2141951"/>
+          </a:xfrm>
+          <a:prstGeom prst="line">
+            <a:avLst/>
+          </a:prstGeom>
+          <a:ln w="28575">
+            <a:solidFill>
+              <a:schemeClr val="bg1">
+                <a:lumMod val="50000"/>
+              </a:schemeClr>
+            </a:solidFill>
+            <a:prstDash val="dashDot"/>
+          </a:ln>
+        </p:spPr>
+        <p:style>
+          <a:lnRef idx="1">
+            <a:schemeClr val="accent1"/>
+          </a:lnRef>
+          <a:fillRef idx="0">
+            <a:schemeClr val="accent1"/>
+          </a:fillRef>
+          <a:effectRef idx="0">
+            <a:schemeClr val="accent1"/>
+          </a:effectRef>
+          <a:fontRef idx="minor">
+            <a:schemeClr val="tx1"/>
+          </a:fontRef>
+        </p:style>
+      </p:cxnSp>
+      <p:cxnSp>
+        <p:nvCxnSpPr>
+          <p:cNvPr id="22" name="Straight Connector 21">
+            <a:extLst>
+              <a:ext uri="{FF2B5EF4-FFF2-40B4-BE49-F238E27FC236}">
+                <a16:creationId xmlns:a16="http://schemas.microsoft.com/office/drawing/2014/main" id="{C07270B5-8B91-5344-A56B-60EEAE3F4125}"/>
+              </a:ext>
+            </a:extLst>
+          </p:cNvPr>
+          <p:cNvCxnSpPr/>
+          <p:nvPr/>
+        </p:nvCxnSpPr>
+        <p:spPr>
+          <a:xfrm flipV="1">
+            <a:off x="5803725" y="1014608"/>
+            <a:ext cx="0" cy="2141951"/>
+          </a:xfrm>
+          <a:prstGeom prst="line">
+            <a:avLst/>
+          </a:prstGeom>
+          <a:ln w="28575">
+            <a:solidFill>
+              <a:schemeClr val="bg1">
+                <a:lumMod val="50000"/>
+              </a:schemeClr>
+            </a:solidFill>
+            <a:prstDash val="dashDot"/>
+          </a:ln>
+        </p:spPr>
+        <p:style>
+          <a:lnRef idx="1">
+            <a:schemeClr val="accent1"/>
+          </a:lnRef>
+          <a:fillRef idx="0">
+            <a:schemeClr val="accent1"/>
+          </a:fillRef>
+          <a:effectRef idx="0">
+            <a:schemeClr val="accent1"/>
+          </a:effectRef>
+          <a:fontRef idx="minor">
+            <a:schemeClr val="tx1"/>
+          </a:fontRef>
+        </p:style>
+      </p:cxnSp>
+      <p:sp>
+        <p:nvSpPr>
+          <p:cNvPr id="8" name="TextBox 7">
+            <a:extLst>
+              <a:ext uri="{FF2B5EF4-FFF2-40B4-BE49-F238E27FC236}">
+                <a16:creationId xmlns:a16="http://schemas.microsoft.com/office/drawing/2014/main" id="{4FC16883-B7F7-9F4F-9BDE-8546FE5BD54C}"/>
+              </a:ext>
+            </a:extLst>
+          </p:cNvPr>
+          <p:cNvSpPr txBox="1"/>
+          <p:nvPr/>
+        </p:nvSpPr>
+        <p:spPr>
+          <a:xfrm>
+            <a:off x="4345979" y="12852"/>
+            <a:ext cx="2583271" cy="369332"/>
+          </a:xfrm>
+          <a:prstGeom prst="rect">
+            <a:avLst/>
+          </a:prstGeom>
+          <a:noFill/>
+        </p:spPr>
+        <p:txBody>
+          <a:bodyPr wrap="none" rtlCol="0">
+            <a:spAutoFit/>
+          </a:bodyPr>
+          <a:lstStyle/>
+          <a:p>
+            <a:r>
+              <a:rPr lang="en-US" dirty="0">
+                <a:latin typeface="Times New Roman" panose="02020603050405020304" pitchFamily="18" charset="0"/>
+                <a:cs typeface="Times New Roman" panose="02020603050405020304" pitchFamily="18" charset="0"/>
+              </a:rPr>
+              <a:t>B. Mirror Tracing (errors)</a:t>
+            </a:r>
+          </a:p>
+        </p:txBody>
+      </p:sp>
+      <p:sp>
+        <p:nvSpPr>
+          <p:cNvPr id="9" name="TextBox 8">
+            <a:extLst>
+              <a:ext uri="{FF2B5EF4-FFF2-40B4-BE49-F238E27FC236}">
+                <a16:creationId xmlns:a16="http://schemas.microsoft.com/office/drawing/2014/main" id="{E01303D7-8A07-0841-90F7-EC92D251D2D6}"/>
+              </a:ext>
+            </a:extLst>
+          </p:cNvPr>
+          <p:cNvSpPr txBox="1"/>
+          <p:nvPr/>
+        </p:nvSpPr>
+        <p:spPr>
+          <a:xfrm>
+            <a:off x="682880" y="12852"/>
+            <a:ext cx="1806905" cy="369332"/>
+          </a:xfrm>
+          <a:prstGeom prst="rect">
+            <a:avLst/>
+          </a:prstGeom>
+          <a:noFill/>
+        </p:spPr>
+        <p:txBody>
+          <a:bodyPr wrap="none" rtlCol="0">
+            <a:spAutoFit/>
+          </a:bodyPr>
+          <a:lstStyle/>
+          <a:p>
+            <a:r>
+              <a:rPr lang="en-US" dirty="0">
+                <a:latin typeface="Times New Roman" panose="02020603050405020304" pitchFamily="18" charset="0"/>
+                <a:cs typeface="Times New Roman" panose="02020603050405020304" pitchFamily="18" charset="0"/>
+              </a:rPr>
+              <a:t>A. Rotary Pursuit</a:t>
+            </a:r>
+          </a:p>
+        </p:txBody>
+      </p:sp>
+      <p:sp>
+        <p:nvSpPr>
+          <p:cNvPr id="13" name="TextBox 12">
+            <a:extLst>
+              <a:ext uri="{FF2B5EF4-FFF2-40B4-BE49-F238E27FC236}">
+                <a16:creationId xmlns:a16="http://schemas.microsoft.com/office/drawing/2014/main" id="{C7B6C465-7F7F-3148-8303-207800C30F39}"/>
+              </a:ext>
+            </a:extLst>
+          </p:cNvPr>
+          <p:cNvSpPr txBox="1"/>
+          <p:nvPr/>
+        </p:nvSpPr>
+        <p:spPr>
+          <a:xfrm>
+            <a:off x="8368922" y="12852"/>
+            <a:ext cx="2454518" cy="369332"/>
+          </a:xfrm>
+          <a:prstGeom prst="rect">
+            <a:avLst/>
+          </a:prstGeom>
+          <a:noFill/>
+        </p:spPr>
+        <p:txBody>
+          <a:bodyPr wrap="none" rtlCol="0">
+            <a:spAutoFit/>
+          </a:bodyPr>
+          <a:lstStyle/>
+          <a:p>
+            <a:r>
+              <a:rPr lang="en-US" dirty="0">
+                <a:latin typeface="Times New Roman" panose="02020603050405020304" pitchFamily="18" charset="0"/>
+                <a:cs typeface="Times New Roman" panose="02020603050405020304" pitchFamily="18" charset="0"/>
+              </a:rPr>
+              <a:t>C. Mirror Tracing (time)</a:t>
+            </a:r>
+          </a:p>
+        </p:txBody>
+      </p:sp>
+      <p:sp>
+        <p:nvSpPr>
+          <p:cNvPr id="16" name="TextBox 15">
+            <a:extLst>
+              <a:ext uri="{FF2B5EF4-FFF2-40B4-BE49-F238E27FC236}">
+                <a16:creationId xmlns:a16="http://schemas.microsoft.com/office/drawing/2014/main" id="{E32102C2-A032-4A43-BA60-A2B52B24C10A}"/>
+              </a:ext>
+            </a:extLst>
+          </p:cNvPr>
+          <p:cNvSpPr txBox="1"/>
+          <p:nvPr/>
+        </p:nvSpPr>
+        <p:spPr>
+          <a:xfrm>
+            <a:off x="639094" y="3677920"/>
+            <a:ext cx="3134256" cy="369332"/>
+          </a:xfrm>
+          <a:prstGeom prst="rect">
+            <a:avLst/>
+          </a:prstGeom>
+          <a:noFill/>
+        </p:spPr>
+        <p:txBody>
+          <a:bodyPr wrap="none" rtlCol="0">
+            <a:spAutoFit/>
+          </a:bodyPr>
+          <a:lstStyle/>
+          <a:p>
+            <a:r>
+              <a:rPr lang="en-US" dirty="0">
+                <a:latin typeface="Times New Roman" panose="02020603050405020304" pitchFamily="18" charset="0"/>
+                <a:cs typeface="Times New Roman" panose="02020603050405020304" pitchFamily="18" charset="0"/>
+              </a:rPr>
+              <a:t>C. Auditory Statistical Learning</a:t>
+            </a:r>
+          </a:p>
+        </p:txBody>
+      </p:sp>
+      <p:sp>
+        <p:nvSpPr>
+          <p:cNvPr id="17" name="TextBox 16">
+            <a:extLst>
+              <a:ext uri="{FF2B5EF4-FFF2-40B4-BE49-F238E27FC236}">
+                <a16:creationId xmlns:a16="http://schemas.microsoft.com/office/drawing/2014/main" id="{6E7B61C2-8493-8542-9483-7DC9A3309C7D}"/>
+              </a:ext>
+            </a:extLst>
+          </p:cNvPr>
+          <p:cNvSpPr txBox="1"/>
+          <p:nvPr/>
+        </p:nvSpPr>
+        <p:spPr>
+          <a:xfrm>
+            <a:off x="7453207" y="3677920"/>
+            <a:ext cx="2910990" cy="369332"/>
+          </a:xfrm>
+          <a:prstGeom prst="rect">
+            <a:avLst/>
+          </a:prstGeom>
+          <a:noFill/>
+        </p:spPr>
+        <p:txBody>
+          <a:bodyPr wrap="none" rtlCol="0">
+            <a:spAutoFit/>
+          </a:bodyPr>
+          <a:lstStyle/>
+          <a:p>
+            <a:r>
+              <a:rPr lang="en-US" dirty="0">
+                <a:latin typeface="Times New Roman" panose="02020603050405020304" pitchFamily="18" charset="0"/>
+                <a:cs typeface="Times New Roman" panose="02020603050405020304" pitchFamily="18" charset="0"/>
+              </a:rPr>
+              <a:t>D. Visual Statistical Learning</a:t>
+            </a:r>
+          </a:p>
+        </p:txBody>
+      </p:sp>
       <p:pic>
         <p:nvPicPr>
-          <p:cNvPr id="19" name="Picture 18">
-            <a:extLst>
-              <a:ext uri="{FF2B5EF4-FFF2-40B4-BE49-F238E27FC236}">
-                <a16:creationId xmlns:a16="http://schemas.microsoft.com/office/drawing/2014/main" id="{E9F7120D-AC21-AF40-9582-12E720620FB8}"/>
+          <p:cNvPr id="24" name="Picture 23">
+            <a:extLst>
+              <a:ext uri="{FF2B5EF4-FFF2-40B4-BE49-F238E27FC236}">
+                <a16:creationId xmlns:a16="http://schemas.microsoft.com/office/drawing/2014/main" id="{2D751E31-AC46-9644-BBD4-EBE4D7BAC6DB}"/>
               </a:ext>
             </a:extLst>
           </p:cNvPr>
@@ -3650,25 +3782,69 @@
         </p:nvPicPr>
         <p:blipFill rotWithShape="1">
           <a:blip r:embed="rId6"/>
-          <a:srcRect r="20729"/>
+          <a:srcRect r="19243"/>
           <a:stretch/>
         </p:blipFill>
         <p:spPr>
           <a:xfrm>
-            <a:off x="3794952" y="478030"/>
-            <a:ext cx="3181059" cy="3032308"/>
+            <a:off x="7530134" y="296628"/>
+            <a:ext cx="3853558" cy="3350033"/>
           </a:xfrm>
           <a:prstGeom prst="rect">
             <a:avLst/>
           </a:prstGeom>
         </p:spPr>
       </p:pic>
+      <p:cxnSp>
+        <p:nvCxnSpPr>
+          <p:cNvPr id="25" name="Straight Connector 24">
+            <a:extLst>
+              <a:ext uri="{FF2B5EF4-FFF2-40B4-BE49-F238E27FC236}">
+                <a16:creationId xmlns:a16="http://schemas.microsoft.com/office/drawing/2014/main" id="{91641485-B577-5D42-A716-4709CB43B606}"/>
+              </a:ext>
+            </a:extLst>
+          </p:cNvPr>
+          <p:cNvCxnSpPr/>
+          <p:nvPr/>
+        </p:nvCxnSpPr>
+        <p:spPr>
+          <a:xfrm flipV="1">
+            <a:off x="9456913" y="1014608"/>
+            <a:ext cx="0" cy="2141951"/>
+          </a:xfrm>
+          <a:prstGeom prst="line">
+            <a:avLst/>
+          </a:prstGeom>
+          <a:ln w="28575">
+            <a:solidFill>
+              <a:schemeClr val="bg1">
+                <a:lumMod val="50000"/>
+              </a:schemeClr>
+            </a:solidFill>
+            <a:prstDash val="dashDot"/>
+          </a:ln>
+        </p:spPr>
+        <p:style>
+          <a:lnRef idx="1">
+            <a:schemeClr val="accent1"/>
+          </a:lnRef>
+          <a:fillRef idx="0">
+            <a:schemeClr val="accent1"/>
+          </a:fillRef>
+          <a:effectRef idx="0">
+            <a:schemeClr val="accent1"/>
+          </a:effectRef>
+          <a:fontRef idx="minor">
+            <a:schemeClr val="tx1"/>
+          </a:fontRef>
+        </p:style>
+      </p:cxnSp>
       <p:pic>
         <p:nvPicPr>
-          <p:cNvPr id="20" name="Picture 19">
-            <a:extLst>
-              <a:ext uri="{FF2B5EF4-FFF2-40B4-BE49-F238E27FC236}">
-                <a16:creationId xmlns:a16="http://schemas.microsoft.com/office/drawing/2014/main" id="{99DC8F19-8EDA-E243-92D2-A3256530C216}"/>
+          <p:cNvPr id="10" name="Picture 9">
+            <a:extLst>
+              <a:ext uri="{FF2B5EF4-FFF2-40B4-BE49-F238E27FC236}">
+                <a16:creationId xmlns:a16="http://schemas.microsoft.com/office/drawing/2014/main" id="{FD3ACB89-5BFD-9B4D-ADB6-5114790B8FCE}"/>
               </a:ext>
             </a:extLst>
           </p:cNvPr>
@@ -3679,13 +3855,13 @@
         </p:nvPicPr>
         <p:blipFill rotWithShape="1">
           <a:blip r:embed="rId7"/>
-          <a:srcRect r="19243"/>
+          <a:srcRect l="84336" t="35830" b="44863"/>
           <a:stretch/>
         </p:blipFill>
         <p:spPr>
           <a:xfrm>
-            <a:off x="7375847" y="478030"/>
-            <a:ext cx="3409063" cy="2963618"/>
+            <a:off x="10865275" y="638778"/>
+            <a:ext cx="1205530" cy="917096"/>
           </a:xfrm>
           <a:prstGeom prst="rect">
             <a:avLst/>
@@ -4542,35 +4718,6 @@
           <a:xfrm>
             <a:off x="11189837" y="1417099"/>
             <a:ext cx="633208" cy="492844"/>
-          </a:xfrm>
-          <a:prstGeom prst="rect">
-            <a:avLst/>
-          </a:prstGeom>
-        </p:spPr>
-      </p:pic>
-      <p:pic>
-        <p:nvPicPr>
-          <p:cNvPr id="2" name="Picture 1">
-            <a:extLst>
-              <a:ext uri="{FF2B5EF4-FFF2-40B4-BE49-F238E27FC236}">
-                <a16:creationId xmlns:a16="http://schemas.microsoft.com/office/drawing/2014/main" id="{03CFF213-6CEE-FF4D-941A-563FD316D6BE}"/>
-              </a:ext>
-            </a:extLst>
-          </p:cNvPr>
-          <p:cNvPicPr>
-            <a:picLocks noChangeAspect="1"/>
-          </p:cNvPicPr>
-          <p:nvPr/>
-        </p:nvPicPr>
-        <p:blipFill rotWithShape="1">
-          <a:blip r:embed="rId8"/>
-          <a:srcRect l="6583" b="13231"/>
-          <a:stretch/>
-        </p:blipFill>
-        <p:spPr>
-          <a:xfrm>
-            <a:off x="4472821" y="37801"/>
-            <a:ext cx="1345127" cy="812374"/>
           </a:xfrm>
           <a:prstGeom prst="rect">
             <a:avLst/>

</xml_diff>